<commit_message>
minor updates - images/CL and small paper updates
</commit_message>
<xml_diff>
--- a/paper/elsarticle/images/CL.pptx
+++ b/paper/elsarticle/images/CL.pptx
@@ -262,7 +262,7 @@
           <a:p>
             <a:fld id="{9B347302-7987-48BC-AA49-F1B089F3BA72}" type="datetimeFigureOut">
               <a:rPr lang="en-US" smtClean="0"/>
-              <a:t>1/31/2023</a:t>
+              <a:t>2/1/2023</a:t>
             </a:fld>
             <a:endParaRPr lang="en-US"/>
           </a:p>
@@ -462,7 +462,7 @@
           <a:p>
             <a:fld id="{9B347302-7987-48BC-AA49-F1B089F3BA72}" type="datetimeFigureOut">
               <a:rPr lang="en-US" smtClean="0"/>
-              <a:t>1/31/2023</a:t>
+              <a:t>2/1/2023</a:t>
             </a:fld>
             <a:endParaRPr lang="en-US"/>
           </a:p>
@@ -672,7 +672,7 @@
           <a:p>
             <a:fld id="{9B347302-7987-48BC-AA49-F1B089F3BA72}" type="datetimeFigureOut">
               <a:rPr lang="en-US" smtClean="0"/>
-              <a:t>1/31/2023</a:t>
+              <a:t>2/1/2023</a:t>
             </a:fld>
             <a:endParaRPr lang="en-US"/>
           </a:p>
@@ -872,7 +872,7 @@
           <a:p>
             <a:fld id="{9B347302-7987-48BC-AA49-F1B089F3BA72}" type="datetimeFigureOut">
               <a:rPr lang="en-US" smtClean="0"/>
-              <a:t>1/31/2023</a:t>
+              <a:t>2/1/2023</a:t>
             </a:fld>
             <a:endParaRPr lang="en-US"/>
           </a:p>
@@ -1148,7 +1148,7 @@
           <a:p>
             <a:fld id="{9B347302-7987-48BC-AA49-F1B089F3BA72}" type="datetimeFigureOut">
               <a:rPr lang="en-US" smtClean="0"/>
-              <a:t>1/31/2023</a:t>
+              <a:t>2/1/2023</a:t>
             </a:fld>
             <a:endParaRPr lang="en-US"/>
           </a:p>
@@ -1416,7 +1416,7 @@
           <a:p>
             <a:fld id="{9B347302-7987-48BC-AA49-F1B089F3BA72}" type="datetimeFigureOut">
               <a:rPr lang="en-US" smtClean="0"/>
-              <a:t>1/31/2023</a:t>
+              <a:t>2/1/2023</a:t>
             </a:fld>
             <a:endParaRPr lang="en-US"/>
           </a:p>
@@ -1831,7 +1831,7 @@
           <a:p>
             <a:fld id="{9B347302-7987-48BC-AA49-F1B089F3BA72}" type="datetimeFigureOut">
               <a:rPr lang="en-US" smtClean="0"/>
-              <a:t>1/31/2023</a:t>
+              <a:t>2/1/2023</a:t>
             </a:fld>
             <a:endParaRPr lang="en-US"/>
           </a:p>
@@ -1973,7 +1973,7 @@
           <a:p>
             <a:fld id="{9B347302-7987-48BC-AA49-F1B089F3BA72}" type="datetimeFigureOut">
               <a:rPr lang="en-US" smtClean="0"/>
-              <a:t>1/31/2023</a:t>
+              <a:t>2/1/2023</a:t>
             </a:fld>
             <a:endParaRPr lang="en-US"/>
           </a:p>
@@ -2086,7 +2086,7 @@
           <a:p>
             <a:fld id="{9B347302-7987-48BC-AA49-F1B089F3BA72}" type="datetimeFigureOut">
               <a:rPr lang="en-US" smtClean="0"/>
-              <a:t>1/31/2023</a:t>
+              <a:t>2/1/2023</a:t>
             </a:fld>
             <a:endParaRPr lang="en-US"/>
           </a:p>
@@ -2399,7 +2399,7 @@
           <a:p>
             <a:fld id="{9B347302-7987-48BC-AA49-F1B089F3BA72}" type="datetimeFigureOut">
               <a:rPr lang="en-US" smtClean="0"/>
-              <a:t>1/31/2023</a:t>
+              <a:t>2/1/2023</a:t>
             </a:fld>
             <a:endParaRPr lang="en-US"/>
           </a:p>
@@ -2688,7 +2688,7 @@
           <a:p>
             <a:fld id="{9B347302-7987-48BC-AA49-F1B089F3BA72}" type="datetimeFigureOut">
               <a:rPr lang="en-US" smtClean="0"/>
-              <a:t>1/31/2023</a:t>
+              <a:t>2/1/2023</a:t>
             </a:fld>
             <a:endParaRPr lang="en-US"/>
           </a:p>
@@ -2931,7 +2931,7 @@
           <a:p>
             <a:fld id="{9B347302-7987-48BC-AA49-F1B089F3BA72}" type="datetimeFigureOut">
               <a:rPr lang="en-US" smtClean="0"/>
-              <a:t>1/31/2023</a:t>
+              <a:t>2/1/2023</a:t>
             </a:fld>
             <a:endParaRPr lang="en-US"/>
           </a:p>
@@ -4036,7 +4036,7 @@
         <p:spPr>
           <a:xfrm flipV="1">
             <a:off x="10276812" y="2920843"/>
-            <a:ext cx="1008000" cy="0"/>
+            <a:ext cx="1476000" cy="0"/>
           </a:xfrm>
           <a:prstGeom prst="straightConnector1">
             <a:avLst/>
@@ -4374,9 +4374,9 @@
           <p:nvPr/>
         </p:nvCxnSpPr>
         <p:spPr>
-          <a:xfrm flipH="1" flipV="1">
-            <a:off x="7311786" y="4396480"/>
-            <a:ext cx="3169130" cy="2300"/>
+          <a:xfrm flipH="1">
+            <a:off x="7311786" y="4396478"/>
+            <a:ext cx="3047943" cy="2"/>
           </a:xfrm>
           <a:prstGeom prst="straightConnector1">
             <a:avLst/>
@@ -4419,7 +4419,7 @@
         </p:nvCxnSpPr>
         <p:spPr>
           <a:xfrm>
-            <a:off x="10480916" y="2923151"/>
+            <a:off x="10359729" y="2923151"/>
             <a:ext cx="0" cy="2017959"/>
           </a:xfrm>
           <a:prstGeom prst="line">
@@ -4463,7 +4463,7 @@
         <p:spPr>
           <a:xfrm flipH="1">
             <a:off x="1166648" y="4941110"/>
-            <a:ext cx="9314268" cy="0"/>
+            <a:ext cx="9180000" cy="0"/>
           </a:xfrm>
           <a:prstGeom prst="line">
             <a:avLst/>
@@ -4721,8 +4721,8 @@
         </p:nvSpPr>
         <p:spPr>
           <a:xfrm>
-            <a:off x="775322" y="2052766"/>
-            <a:ext cx="593432" cy="523220"/>
+            <a:off x="613754" y="2065499"/>
+            <a:ext cx="1043876" cy="523220"/>
           </a:xfrm>
           <a:prstGeom prst="rect">
             <a:avLst/>
@@ -4743,13 +4743,41 @@
               <a:t>y</a:t>
             </a:r>
             <a:r>
-              <a:rPr lang="en-US" sz="2800" baseline="-25000" dirty="0">
+              <a:rPr lang="en-US" sz="2800" i="1" baseline="-25000" dirty="0">
                 <a:latin typeface="Baskerville Old Face" panose="02020602080505020303" pitchFamily="18" charset="0"/>
                 <a:cs typeface="Arabic Typesetting" panose="03020402040406030203" pitchFamily="66" charset="-78"/>
               </a:rPr>
               <a:t>ref</a:t>
             </a:r>
-            <a:endParaRPr lang="en-US" baseline="-25000" dirty="0">
+            <a:r>
+              <a:rPr lang="sk-SK" sz="2800" i="1" baseline="-25000" dirty="0">
+                <a:latin typeface="Baskerville Old Face" panose="02020602080505020303" pitchFamily="18" charset="0"/>
+                <a:cs typeface="Arabic Typesetting" panose="03020402040406030203" pitchFamily="66" charset="-78"/>
+              </a:rPr>
+              <a:t> </a:t>
+            </a:r>
+            <a:r>
+              <a:rPr lang="sk-SK" sz="2800" dirty="0">
+                <a:latin typeface="Baskerville Old Face" panose="02020602080505020303" pitchFamily="18" charset="0"/>
+                <a:cs typeface="Arabic Typesetting" panose="03020402040406030203" pitchFamily="66" charset="-78"/>
+              </a:rPr>
+              <a:t>(</a:t>
+            </a:r>
+            <a:r>
+              <a:rPr lang="sk-SK" sz="2800" i="1" dirty="0">
+                <a:latin typeface="Baskerville Old Face" panose="02020602080505020303" pitchFamily="18" charset="0"/>
+                <a:cs typeface="Arabic Typesetting" panose="03020402040406030203" pitchFamily="66" charset="-78"/>
+              </a:rPr>
+              <a:t>k</a:t>
+            </a:r>
+            <a:r>
+              <a:rPr lang="sk-SK" sz="2800" dirty="0">
+                <a:latin typeface="Baskerville Old Face" panose="02020602080505020303" pitchFamily="18" charset="0"/>
+                <a:cs typeface="Arabic Typesetting" panose="03020402040406030203" pitchFamily="66" charset="-78"/>
+              </a:rPr>
+              <a:t>)</a:t>
+            </a:r>
+            <a:endParaRPr lang="en-US" dirty="0">
               <a:latin typeface="Baskerville Old Face" panose="02020602080505020303" pitchFamily="18" charset="0"/>
               <a:cs typeface="Arabic Typesetting" panose="03020402040406030203" pitchFamily="66" charset="-78"/>
             </a:endParaRPr>
@@ -4771,7 +4799,7 @@
         <p:spPr>
           <a:xfrm>
             <a:off x="10426722" y="2329510"/>
-            <a:ext cx="335348" cy="523220"/>
+            <a:ext cx="816249" cy="523220"/>
           </a:xfrm>
           <a:prstGeom prst="rect">
             <a:avLst/>
@@ -4791,6 +4819,57 @@
               </a:rPr>
               <a:t>y</a:t>
             </a:r>
+            <a:r>
+              <a:rPr kumimoji="0" lang="sk-SK" sz="2800" b="0" i="0" u="none" strike="noStrike" kern="1200" cap="none" spc="0" normalizeH="0" baseline="0" noProof="0" dirty="0">
+                <a:ln>
+                  <a:noFill/>
+                </a:ln>
+                <a:solidFill>
+                  <a:prstClr val="black"/>
+                </a:solidFill>
+                <a:effectLst/>
+                <a:uLnTx/>
+                <a:uFillTx/>
+                <a:latin typeface="Baskerville Old Face" panose="02020602080505020303" pitchFamily="18" charset="0"/>
+                <a:ea typeface="+mn-ea"/>
+                <a:cs typeface="Arabic Typesetting" panose="03020402040406030203" pitchFamily="66" charset="-78"/>
+              </a:rPr>
+              <a:t> (</a:t>
+            </a:r>
+            <a:r>
+              <a:rPr kumimoji="0" lang="sk-SK" sz="2800" b="0" i="1" u="none" strike="noStrike" kern="1200" cap="none" spc="0" normalizeH="0" baseline="0" noProof="0" dirty="0">
+                <a:ln>
+                  <a:noFill/>
+                </a:ln>
+                <a:solidFill>
+                  <a:prstClr val="black"/>
+                </a:solidFill>
+                <a:effectLst/>
+                <a:uLnTx/>
+                <a:uFillTx/>
+                <a:latin typeface="Baskerville Old Face" panose="02020602080505020303" pitchFamily="18" charset="0"/>
+                <a:ea typeface="+mn-ea"/>
+                <a:cs typeface="Arabic Typesetting" panose="03020402040406030203" pitchFamily="66" charset="-78"/>
+              </a:rPr>
+              <a:t>k</a:t>
+            </a:r>
+            <a:r>
+              <a:rPr kumimoji="0" lang="sk-SK" sz="2800" b="0" i="0" u="none" strike="noStrike" kern="1200" cap="none" spc="0" normalizeH="0" baseline="0" noProof="0" dirty="0">
+                <a:ln>
+                  <a:noFill/>
+                </a:ln>
+                <a:solidFill>
+                  <a:prstClr val="black"/>
+                </a:solidFill>
+                <a:effectLst/>
+                <a:uLnTx/>
+                <a:uFillTx/>
+                <a:latin typeface="Baskerville Old Face" panose="02020602080505020303" pitchFamily="18" charset="0"/>
+                <a:ea typeface="+mn-ea"/>
+                <a:cs typeface="Arabic Typesetting" panose="03020402040406030203" pitchFamily="66" charset="-78"/>
+              </a:rPr>
+              <a:t>)</a:t>
+            </a:r>
             <a:endParaRPr lang="en-US" baseline="-25000" dirty="0">
               <a:latin typeface="Baskerville Old Face" panose="02020602080505020303" pitchFamily="18" charset="0"/>
               <a:cs typeface="Arabic Typesetting" panose="03020402040406030203" pitchFamily="66" charset="-78"/>
@@ -4812,8 +4891,8 @@
         </p:nvSpPr>
         <p:spPr>
           <a:xfrm>
-            <a:off x="7634702" y="2372518"/>
-            <a:ext cx="369012" cy="523220"/>
+            <a:off x="7432435" y="2360385"/>
+            <a:ext cx="849913" cy="523220"/>
           </a:xfrm>
           <a:prstGeom prst="rect">
             <a:avLst/>
@@ -4833,6 +4912,57 @@
               </a:rPr>
               <a:t>u</a:t>
             </a:r>
+            <a:r>
+              <a:rPr kumimoji="0" lang="sk-SK" sz="2800" b="0" i="0" u="none" strike="noStrike" kern="1200" cap="none" spc="0" normalizeH="0" baseline="0" noProof="0" dirty="0">
+                <a:ln>
+                  <a:noFill/>
+                </a:ln>
+                <a:solidFill>
+                  <a:prstClr val="black"/>
+                </a:solidFill>
+                <a:effectLst/>
+                <a:uLnTx/>
+                <a:uFillTx/>
+                <a:latin typeface="Baskerville Old Face" panose="02020602080505020303" pitchFamily="18" charset="0"/>
+                <a:ea typeface="+mn-ea"/>
+                <a:cs typeface="Arabic Typesetting" panose="03020402040406030203" pitchFamily="66" charset="-78"/>
+              </a:rPr>
+              <a:t> (</a:t>
+            </a:r>
+            <a:r>
+              <a:rPr kumimoji="0" lang="sk-SK" sz="2800" b="0" i="1" u="none" strike="noStrike" kern="1200" cap="none" spc="0" normalizeH="0" baseline="0" noProof="0" dirty="0">
+                <a:ln>
+                  <a:noFill/>
+                </a:ln>
+                <a:solidFill>
+                  <a:prstClr val="black"/>
+                </a:solidFill>
+                <a:effectLst/>
+                <a:uLnTx/>
+                <a:uFillTx/>
+                <a:latin typeface="Baskerville Old Face" panose="02020602080505020303" pitchFamily="18" charset="0"/>
+                <a:ea typeface="+mn-ea"/>
+                <a:cs typeface="Arabic Typesetting" panose="03020402040406030203" pitchFamily="66" charset="-78"/>
+              </a:rPr>
+              <a:t>k</a:t>
+            </a:r>
+            <a:r>
+              <a:rPr kumimoji="0" lang="sk-SK" sz="2800" b="0" i="0" u="none" strike="noStrike" kern="1200" cap="none" spc="0" normalizeH="0" baseline="0" noProof="0" dirty="0">
+                <a:ln>
+                  <a:noFill/>
+                </a:ln>
+                <a:solidFill>
+                  <a:prstClr val="black"/>
+                </a:solidFill>
+                <a:effectLst/>
+                <a:uLnTx/>
+                <a:uFillTx/>
+                <a:latin typeface="Baskerville Old Face" panose="02020602080505020303" pitchFamily="18" charset="0"/>
+                <a:ea typeface="+mn-ea"/>
+                <a:cs typeface="Arabic Typesetting" panose="03020402040406030203" pitchFamily="66" charset="-78"/>
+              </a:rPr>
+              <a:t>)</a:t>
+            </a:r>
             <a:endParaRPr lang="en-US" baseline="-25000" dirty="0">
               <a:latin typeface="Baskerville Old Face" panose="02020602080505020303" pitchFamily="18" charset="0"/>
               <a:cs typeface="Arabic Typesetting" panose="03020402040406030203" pitchFamily="66" charset="-78"/>
@@ -4854,8 +4984,8 @@
         </p:nvSpPr>
         <p:spPr>
           <a:xfrm>
-            <a:off x="5135410" y="1837165"/>
-            <a:ext cx="514885" cy="523220"/>
+            <a:off x="4979872" y="1910976"/>
+            <a:ext cx="995785" cy="523220"/>
           </a:xfrm>
           <a:prstGeom prst="rect">
             <a:avLst/>
@@ -4882,6 +5012,57 @@
               </a:rPr>
               <a:t>L</a:t>
             </a:r>
+            <a:r>
+              <a:rPr kumimoji="0" lang="sk-SK" sz="2800" b="0" i="0" u="none" strike="noStrike" kern="1200" cap="none" spc="0" normalizeH="0" baseline="0" noProof="0" dirty="0">
+                <a:ln>
+                  <a:noFill/>
+                </a:ln>
+                <a:solidFill>
+                  <a:prstClr val="black"/>
+                </a:solidFill>
+                <a:effectLst/>
+                <a:uLnTx/>
+                <a:uFillTx/>
+                <a:latin typeface="Baskerville Old Face" panose="02020602080505020303" pitchFamily="18" charset="0"/>
+                <a:ea typeface="+mn-ea"/>
+                <a:cs typeface="Arabic Typesetting" panose="03020402040406030203" pitchFamily="66" charset="-78"/>
+              </a:rPr>
+              <a:t> (</a:t>
+            </a:r>
+            <a:r>
+              <a:rPr kumimoji="0" lang="sk-SK" sz="2800" b="0" i="1" u="none" strike="noStrike" kern="1200" cap="none" spc="0" normalizeH="0" baseline="0" noProof="0" dirty="0">
+                <a:ln>
+                  <a:noFill/>
+                </a:ln>
+                <a:solidFill>
+                  <a:prstClr val="black"/>
+                </a:solidFill>
+                <a:effectLst/>
+                <a:uLnTx/>
+                <a:uFillTx/>
+                <a:latin typeface="Baskerville Old Face" panose="02020602080505020303" pitchFamily="18" charset="0"/>
+                <a:ea typeface="+mn-ea"/>
+                <a:cs typeface="Arabic Typesetting" panose="03020402040406030203" pitchFamily="66" charset="-78"/>
+              </a:rPr>
+              <a:t>k</a:t>
+            </a:r>
+            <a:r>
+              <a:rPr kumimoji="0" lang="sk-SK" sz="2800" b="0" i="0" u="none" strike="noStrike" kern="1200" cap="none" spc="0" normalizeH="0" baseline="0" noProof="0" dirty="0">
+                <a:ln>
+                  <a:noFill/>
+                </a:ln>
+                <a:solidFill>
+                  <a:prstClr val="black"/>
+                </a:solidFill>
+                <a:effectLst/>
+                <a:uLnTx/>
+                <a:uFillTx/>
+                <a:latin typeface="Baskerville Old Face" panose="02020602080505020303" pitchFamily="18" charset="0"/>
+                <a:ea typeface="+mn-ea"/>
+                <a:cs typeface="Arabic Typesetting" panose="03020402040406030203" pitchFamily="66" charset="-78"/>
+              </a:rPr>
+              <a:t>)</a:t>
+            </a:r>
             <a:endParaRPr lang="en-US" baseline="-25000" dirty="0">
               <a:latin typeface="Baskerville Old Face" panose="02020602080505020303" pitchFamily="18" charset="0"/>
               <a:cs typeface="Arabic Typesetting" panose="03020402040406030203" pitchFamily="66" charset="-78"/>
@@ -4903,8 +5084,8 @@
         </p:nvSpPr>
         <p:spPr>
           <a:xfrm>
-            <a:off x="5132351" y="2787038"/>
-            <a:ext cx="524503" cy="523220"/>
+            <a:off x="4987459" y="2775040"/>
+            <a:ext cx="1005403" cy="523220"/>
           </a:xfrm>
           <a:prstGeom prst="rect">
             <a:avLst/>
@@ -4931,6 +5112,57 @@
               </a:rPr>
               <a:t>R</a:t>
             </a:r>
+            <a:r>
+              <a:rPr kumimoji="0" lang="sk-SK" sz="2800" b="0" i="0" u="none" strike="noStrike" kern="1200" cap="none" spc="0" normalizeH="0" baseline="0" noProof="0" dirty="0">
+                <a:ln>
+                  <a:noFill/>
+                </a:ln>
+                <a:solidFill>
+                  <a:prstClr val="black"/>
+                </a:solidFill>
+                <a:effectLst/>
+                <a:uLnTx/>
+                <a:uFillTx/>
+                <a:latin typeface="Baskerville Old Face" panose="02020602080505020303" pitchFamily="18" charset="0"/>
+                <a:ea typeface="+mn-ea"/>
+                <a:cs typeface="Arabic Typesetting" panose="03020402040406030203" pitchFamily="66" charset="-78"/>
+              </a:rPr>
+              <a:t> (</a:t>
+            </a:r>
+            <a:r>
+              <a:rPr kumimoji="0" lang="sk-SK" sz="2800" b="0" i="1" u="none" strike="noStrike" kern="1200" cap="none" spc="0" normalizeH="0" baseline="0" noProof="0" dirty="0">
+                <a:ln>
+                  <a:noFill/>
+                </a:ln>
+                <a:solidFill>
+                  <a:prstClr val="black"/>
+                </a:solidFill>
+                <a:effectLst/>
+                <a:uLnTx/>
+                <a:uFillTx/>
+                <a:latin typeface="Baskerville Old Face" panose="02020602080505020303" pitchFamily="18" charset="0"/>
+                <a:ea typeface="+mn-ea"/>
+                <a:cs typeface="Arabic Typesetting" panose="03020402040406030203" pitchFamily="66" charset="-78"/>
+              </a:rPr>
+              <a:t>k</a:t>
+            </a:r>
+            <a:r>
+              <a:rPr kumimoji="0" lang="sk-SK" sz="2800" b="0" i="0" u="none" strike="noStrike" kern="1200" cap="none" spc="0" normalizeH="0" baseline="0" noProof="0" dirty="0">
+                <a:ln>
+                  <a:noFill/>
+                </a:ln>
+                <a:solidFill>
+                  <a:prstClr val="black"/>
+                </a:solidFill>
+                <a:effectLst/>
+                <a:uLnTx/>
+                <a:uFillTx/>
+                <a:latin typeface="Baskerville Old Face" panose="02020602080505020303" pitchFamily="18" charset="0"/>
+                <a:ea typeface="+mn-ea"/>
+                <a:cs typeface="Arabic Typesetting" panose="03020402040406030203" pitchFamily="66" charset="-78"/>
+              </a:rPr>
+              <a:t>)</a:t>
+            </a:r>
             <a:endParaRPr lang="en-US" baseline="-25000" dirty="0">
               <a:latin typeface="Baskerville Old Face" panose="02020602080505020303" pitchFamily="18" charset="0"/>
               <a:cs typeface="Arabic Typesetting" panose="03020402040406030203" pitchFamily="66" charset="-78"/>
@@ -4952,8 +5184,8 @@
         </p:nvSpPr>
         <p:spPr>
           <a:xfrm>
-            <a:off x="2122040" y="2346696"/>
-            <a:ext cx="351378" cy="461665"/>
+            <a:off x="1982043" y="2369296"/>
+            <a:ext cx="684803" cy="461665"/>
           </a:xfrm>
           <a:prstGeom prst="rect">
             <a:avLst/>
@@ -4972,7 +5204,7 @@
                 <a:ea typeface="Calibri" panose="020F0502020204030204" pitchFamily="34" charset="0"/>
                 <a:cs typeface="Arabic Typesetting" panose="03020402040406030203" pitchFamily="66" charset="-78"/>
               </a:rPr>
-              <a:t>θ</a:t>
+              <a:t>θ(k)</a:t>
             </a:r>
             <a:endParaRPr lang="en-US" baseline="-25000" dirty="0">
               <a:latin typeface="Baskerville Old Face" panose="02020602080505020303" pitchFamily="18" charset="0"/>
@@ -4995,8 +5227,8 @@
         </p:nvSpPr>
         <p:spPr>
           <a:xfrm>
-            <a:off x="5135410" y="3836013"/>
-            <a:ext cx="431528" cy="523220"/>
+            <a:off x="5033945" y="3836013"/>
+            <a:ext cx="912429" cy="523220"/>
           </a:xfrm>
           <a:prstGeom prst="rect">
             <a:avLst/>
@@ -5023,6 +5255,57 @@
               </a:rPr>
               <a:t>I</a:t>
             </a:r>
+            <a:r>
+              <a:rPr kumimoji="0" lang="sk-SK" sz="2800" b="0" i="0" u="none" strike="noStrike" kern="1200" cap="none" spc="0" normalizeH="0" baseline="0" noProof="0" dirty="0">
+                <a:ln>
+                  <a:noFill/>
+                </a:ln>
+                <a:solidFill>
+                  <a:prstClr val="black"/>
+                </a:solidFill>
+                <a:effectLst/>
+                <a:uLnTx/>
+                <a:uFillTx/>
+                <a:latin typeface="Baskerville Old Face" panose="02020602080505020303" pitchFamily="18" charset="0"/>
+                <a:ea typeface="+mn-ea"/>
+                <a:cs typeface="Arabic Typesetting" panose="03020402040406030203" pitchFamily="66" charset="-78"/>
+              </a:rPr>
+              <a:t> (</a:t>
+            </a:r>
+            <a:r>
+              <a:rPr kumimoji="0" lang="sk-SK" sz="2800" b="0" i="1" u="none" strike="noStrike" kern="1200" cap="none" spc="0" normalizeH="0" baseline="0" noProof="0" dirty="0">
+                <a:ln>
+                  <a:noFill/>
+                </a:ln>
+                <a:solidFill>
+                  <a:prstClr val="black"/>
+                </a:solidFill>
+                <a:effectLst/>
+                <a:uLnTx/>
+                <a:uFillTx/>
+                <a:latin typeface="Baskerville Old Face" panose="02020602080505020303" pitchFamily="18" charset="0"/>
+                <a:ea typeface="+mn-ea"/>
+                <a:cs typeface="Arabic Typesetting" panose="03020402040406030203" pitchFamily="66" charset="-78"/>
+              </a:rPr>
+              <a:t>k</a:t>
+            </a:r>
+            <a:r>
+              <a:rPr kumimoji="0" lang="sk-SK" sz="2800" b="0" i="0" u="none" strike="noStrike" kern="1200" cap="none" spc="0" normalizeH="0" baseline="0" noProof="0" dirty="0">
+                <a:ln>
+                  <a:noFill/>
+                </a:ln>
+                <a:solidFill>
+                  <a:prstClr val="black"/>
+                </a:solidFill>
+                <a:effectLst/>
+                <a:uLnTx/>
+                <a:uFillTx/>
+                <a:latin typeface="Baskerville Old Face" panose="02020602080505020303" pitchFamily="18" charset="0"/>
+                <a:ea typeface="+mn-ea"/>
+                <a:cs typeface="Arabic Typesetting" panose="03020402040406030203" pitchFamily="66" charset="-78"/>
+              </a:rPr>
+              <a:t>)</a:t>
+            </a:r>
             <a:endParaRPr lang="en-US" baseline="-25000" dirty="0">
               <a:latin typeface="Baskerville Old Face" panose="02020602080505020303" pitchFamily="18" charset="0"/>
               <a:cs typeface="Arabic Typesetting" panose="03020402040406030203" pitchFamily="66" charset="-78"/>
@@ -5044,8 +5327,8 @@
         </p:nvSpPr>
         <p:spPr>
           <a:xfrm>
-            <a:off x="9906783" y="1965165"/>
-            <a:ext cx="1568058" cy="584775"/>
+            <a:off x="10308988" y="2775403"/>
+            <a:ext cx="1592093" cy="584775"/>
           </a:xfrm>
           <a:prstGeom prst="rect">
             <a:avLst/>
@@ -5053,7 +5336,7 @@
           <a:noFill/>
         </p:spPr>
         <p:txBody>
-          <a:bodyPr wrap="none" rtlCol="0">
+          <a:bodyPr wrap="square" rtlCol="0">
             <a:spAutoFit/>
           </a:bodyPr>
           <a:lstStyle/>
@@ -5092,7 +5375,7 @@
         </p:nvSpPr>
         <p:spPr>
           <a:xfrm>
-            <a:off x="7324728" y="1965166"/>
+            <a:off x="7288399" y="2781499"/>
             <a:ext cx="1043876" cy="584775"/>
           </a:xfrm>
           <a:prstGeom prst="rect">
@@ -5140,7 +5423,7 @@
         </p:nvSpPr>
         <p:spPr>
           <a:xfrm>
-            <a:off x="282730" y="1658299"/>
+            <a:off x="361387" y="2464382"/>
             <a:ext cx="1568058" cy="584775"/>
           </a:xfrm>
           <a:prstGeom prst="rect">
@@ -5191,7 +5474,7 @@
         <p:spPr>
           <a:xfrm flipH="1">
             <a:off x="1830642" y="1837165"/>
-            <a:ext cx="4824000" cy="0"/>
+            <a:ext cx="4644000" cy="0"/>
           </a:xfrm>
           <a:prstGeom prst="line">
             <a:avLst/>
@@ -5228,13 +5511,12 @@
           </p:cNvPr>
           <p:cNvCxnSpPr>
             <a:cxnSpLocks/>
-            <a:endCxn id="66" idx="0"/>
           </p:cNvCxnSpPr>
           <p:nvPr/>
         </p:nvCxnSpPr>
         <p:spPr>
           <a:xfrm>
-            <a:off x="6647654" y="1836330"/>
+            <a:off x="6470435" y="1831072"/>
             <a:ext cx="2539" cy="424399"/>
           </a:xfrm>
           <a:prstGeom prst="straightConnector1">
@@ -5305,6 +5587,127 @@
           </a:fontRef>
         </p:style>
       </p:cxnSp>
+      <p:cxnSp>
+        <p:nvCxnSpPr>
+          <p:cNvPr id="2" name="Rovná spojovacia šípka 1">
+            <a:extLst>
+              <a:ext uri="{FF2B5EF4-FFF2-40B4-BE49-F238E27FC236}">
+                <a16:creationId xmlns:a16="http://schemas.microsoft.com/office/drawing/2014/main" id="{FAC240F6-55B5-77B2-8703-9336D0655757}"/>
+              </a:ext>
+            </a:extLst>
+          </p:cNvPr>
+          <p:cNvCxnSpPr>
+            <a:cxnSpLocks/>
+          </p:cNvCxnSpPr>
+          <p:nvPr/>
+        </p:nvCxnSpPr>
+        <p:spPr>
+          <a:xfrm>
+            <a:off x="6657912" y="1638890"/>
+            <a:ext cx="0" cy="604184"/>
+          </a:xfrm>
+          <a:prstGeom prst="straightConnector1">
+            <a:avLst/>
+          </a:prstGeom>
+          <a:ln w="19050">
+            <a:solidFill>
+              <a:schemeClr val="tx2"/>
+            </a:solidFill>
+            <a:tailEnd type="triangle"/>
+          </a:ln>
+        </p:spPr>
+        <p:style>
+          <a:lnRef idx="1">
+            <a:schemeClr val="accent1"/>
+          </a:lnRef>
+          <a:fillRef idx="0">
+            <a:schemeClr val="accent1"/>
+          </a:fillRef>
+          <a:effectRef idx="0">
+            <a:schemeClr val="accent1"/>
+          </a:effectRef>
+          <a:fontRef idx="minor">
+            <a:schemeClr val="tx1"/>
+          </a:fontRef>
+        </p:style>
+      </p:cxnSp>
+      <p:sp>
+        <p:nvSpPr>
+          <p:cNvPr id="7" name="BlokTextu 6">
+            <a:extLst>
+              <a:ext uri="{FF2B5EF4-FFF2-40B4-BE49-F238E27FC236}">
+                <a16:creationId xmlns:a16="http://schemas.microsoft.com/office/drawing/2014/main" id="{DF0C6037-E4B0-52D7-7673-49F79DD6A42E}"/>
+              </a:ext>
+            </a:extLst>
+          </p:cNvPr>
+          <p:cNvSpPr txBox="1"/>
+          <p:nvPr/>
+        </p:nvSpPr>
+        <p:spPr>
+          <a:xfrm>
+            <a:off x="6174908" y="1070470"/>
+            <a:ext cx="1309974" cy="523220"/>
+          </a:xfrm>
+          <a:prstGeom prst="rect">
+            <a:avLst/>
+          </a:prstGeom>
+          <a:noFill/>
+        </p:spPr>
+        <p:txBody>
+          <a:bodyPr wrap="none" rtlCol="0">
+            <a:spAutoFit/>
+          </a:bodyPr>
+          <a:lstStyle/>
+          <a:p>
+            <a:r>
+              <a:rPr lang="en-US" sz="2800" i="1" dirty="0">
+                <a:latin typeface="Baskerville Old Face" panose="02020602080505020303" pitchFamily="18" charset="0"/>
+                <a:cs typeface="Arabic Typesetting" panose="03020402040406030203" pitchFamily="66" charset="-78"/>
+              </a:rPr>
+              <a:t>y</a:t>
+            </a:r>
+            <a:r>
+              <a:rPr lang="en-US" sz="2800" i="1" baseline="-25000" dirty="0">
+                <a:latin typeface="Baskerville Old Face" panose="02020602080505020303" pitchFamily="18" charset="0"/>
+                <a:cs typeface="Arabic Typesetting" panose="03020402040406030203" pitchFamily="66" charset="-78"/>
+              </a:rPr>
+              <a:t>ref</a:t>
+            </a:r>
+            <a:r>
+              <a:rPr lang="sk-SK" sz="2800" i="1" baseline="-25000" dirty="0">
+                <a:latin typeface="Baskerville Old Face" panose="02020602080505020303" pitchFamily="18" charset="0"/>
+                <a:cs typeface="Arabic Typesetting" panose="03020402040406030203" pitchFamily="66" charset="-78"/>
+              </a:rPr>
+              <a:t> </a:t>
+            </a:r>
+            <a:r>
+              <a:rPr lang="sk-SK" sz="2800" dirty="0">
+                <a:latin typeface="Baskerville Old Face" panose="02020602080505020303" pitchFamily="18" charset="0"/>
+                <a:cs typeface="Arabic Typesetting" panose="03020402040406030203" pitchFamily="66" charset="-78"/>
+              </a:rPr>
+              <a:t>(</a:t>
+            </a:r>
+            <a:r>
+              <a:rPr lang="sk-SK" sz="2800" i="1" dirty="0">
+                <a:latin typeface="Baskerville Old Face" panose="02020602080505020303" pitchFamily="18" charset="0"/>
+                <a:cs typeface="Arabic Typesetting" panose="03020402040406030203" pitchFamily="66" charset="-78"/>
+              </a:rPr>
+              <a:t>k-1</a:t>
+            </a:r>
+            <a:r>
+              <a:rPr lang="sk-SK" sz="2800" dirty="0">
+                <a:latin typeface="Baskerville Old Face" panose="02020602080505020303" pitchFamily="18" charset="0"/>
+                <a:cs typeface="Arabic Typesetting" panose="03020402040406030203" pitchFamily="66" charset="-78"/>
+              </a:rPr>
+              <a:t>)</a:t>
+            </a:r>
+            <a:endParaRPr lang="en-US" dirty="0">
+              <a:latin typeface="Baskerville Old Face" panose="02020602080505020303" pitchFamily="18" charset="0"/>
+              <a:cs typeface="Arabic Typesetting" panose="03020402040406030203" pitchFamily="66" charset="-78"/>
+            </a:endParaRPr>
+          </a:p>
+        </p:txBody>
+      </p:sp>
     </p:spTree>
     <p:extLst>
       <p:ext uri="{BB962C8B-B14F-4D97-AF65-F5344CB8AC3E}">
@@ -5351,8 +5754,8 @@
         </p:nvCxnSpPr>
         <p:spPr>
           <a:xfrm>
-            <a:off x="10193570" y="2941001"/>
-            <a:ext cx="1028746" cy="0"/>
+            <a:off x="9878469" y="2960830"/>
+            <a:ext cx="936000" cy="0"/>
           </a:xfrm>
           <a:prstGeom prst="straightConnector1">
             <a:avLst/>
@@ -5395,7 +5798,7 @@
         </p:nvCxnSpPr>
         <p:spPr>
           <a:xfrm flipV="1">
-            <a:off x="8811841" y="3594347"/>
+            <a:off x="8927648" y="3621374"/>
             <a:ext cx="0" cy="795663"/>
           </a:xfrm>
           <a:prstGeom prst="straightConnector1">
@@ -5437,8 +5840,8 @@
         </p:nvCxnSpPr>
         <p:spPr>
           <a:xfrm flipV="1">
-            <a:off x="7338144" y="2927855"/>
-            <a:ext cx="1080000" cy="2308"/>
+            <a:off x="7162841" y="2921544"/>
+            <a:ext cx="936000" cy="2308"/>
           </a:xfrm>
           <a:prstGeom prst="straightConnector1">
             <a:avLst/>
@@ -5481,8 +5884,8 @@
         </p:nvCxnSpPr>
         <p:spPr>
           <a:xfrm>
-            <a:off x="288346" y="2634832"/>
-            <a:ext cx="1620000" cy="0"/>
+            <a:off x="1049588" y="2634832"/>
+            <a:ext cx="1120124" cy="0"/>
           </a:xfrm>
           <a:prstGeom prst="straightConnector1">
             <a:avLst/>
@@ -5523,8 +5926,8 @@
         </p:nvSpPr>
         <p:spPr>
           <a:xfrm>
-            <a:off x="687239" y="2129187"/>
-            <a:ext cx="920445" cy="461665"/>
+            <a:off x="1114756" y="2135179"/>
+            <a:ext cx="865943" cy="461665"/>
           </a:xfrm>
           <a:prstGeom prst="rect">
             <a:avLst/>
@@ -5559,6 +5962,76 @@
               <a:t> </a:t>
             </a:r>
             <a:r>
+              <a:rPr lang="sk-SK" sz="2000" dirty="0">
+                <a:latin typeface="Baskerville Old Face" panose="02020602080505020303" pitchFamily="18" charset="0"/>
+                <a:cs typeface="Arabic Typesetting" panose="03020402040406030203" pitchFamily="66" charset="-78"/>
+              </a:rPr>
+              <a:t>(</a:t>
+            </a:r>
+            <a:r>
+              <a:rPr lang="sk-SK" sz="2000" i="1" dirty="0">
+                <a:latin typeface="Baskerville Old Face" panose="02020602080505020303" pitchFamily="18" charset="0"/>
+                <a:cs typeface="Arabic Typesetting" panose="03020402040406030203" pitchFamily="66" charset="-78"/>
+              </a:rPr>
+              <a:t>k</a:t>
+            </a:r>
+            <a:r>
+              <a:rPr lang="sk-SK" sz="2000" dirty="0">
+                <a:latin typeface="Baskerville Old Face" panose="02020602080505020303" pitchFamily="18" charset="0"/>
+                <a:cs typeface="Arabic Typesetting" panose="03020402040406030203" pitchFamily="66" charset="-78"/>
+              </a:rPr>
+              <a:t>)</a:t>
+            </a:r>
+            <a:endParaRPr lang="en-US" sz="1600" dirty="0">
+              <a:latin typeface="Baskerville Old Face" panose="02020602080505020303" pitchFamily="18" charset="0"/>
+              <a:cs typeface="Arabic Typesetting" panose="03020402040406030203" pitchFamily="66" charset="-78"/>
+            </a:endParaRPr>
+          </a:p>
+        </p:txBody>
+      </p:sp>
+      <p:sp>
+        <p:nvSpPr>
+          <p:cNvPr id="124" name="BlokTextu 123">
+            <a:extLst>
+              <a:ext uri="{FF2B5EF4-FFF2-40B4-BE49-F238E27FC236}">
+                <a16:creationId xmlns:a16="http://schemas.microsoft.com/office/drawing/2014/main" id="{A7104031-284C-D084-2066-72E9DFB9C9A3}"/>
+              </a:ext>
+            </a:extLst>
+          </p:cNvPr>
+          <p:cNvSpPr txBox="1"/>
+          <p:nvPr/>
+        </p:nvSpPr>
+        <p:spPr>
+          <a:xfrm>
+            <a:off x="9966397" y="2416482"/>
+            <a:ext cx="760144" cy="523220"/>
+          </a:xfrm>
+          <a:prstGeom prst="rect">
+            <a:avLst/>
+          </a:prstGeom>
+          <a:noFill/>
+        </p:spPr>
+        <p:txBody>
+          <a:bodyPr wrap="none" rtlCol="0">
+            <a:spAutoFit/>
+          </a:bodyPr>
+          <a:lstStyle/>
+          <a:p>
+            <a:r>
+              <a:rPr lang="en-US" sz="2800" i="1" dirty="0">
+                <a:latin typeface="Baskerville Old Face" panose="02020602080505020303" pitchFamily="18" charset="0"/>
+                <a:cs typeface="Arabic Typesetting" panose="03020402040406030203" pitchFamily="66" charset="-78"/>
+              </a:rPr>
+              <a:t>u</a:t>
+            </a:r>
+            <a:r>
+              <a:rPr lang="sk-SK" sz="1800" dirty="0">
+                <a:latin typeface="Baskerville Old Face" panose="02020602080505020303" pitchFamily="18" charset="0"/>
+                <a:cs typeface="Arabic Typesetting" panose="03020402040406030203" pitchFamily="66" charset="-78"/>
+              </a:rPr>
+              <a:t> </a:t>
+            </a:r>
+            <a:r>
               <a:rPr lang="sk-SK" sz="2400" dirty="0">
                 <a:latin typeface="Baskerville Old Face" panose="02020602080505020303" pitchFamily="18" charset="0"/>
                 <a:cs typeface="Arabic Typesetting" panose="03020402040406030203" pitchFamily="66" charset="-78"/>
@@ -5579,7 +6052,7 @@
               </a:rPr>
               <a:t>)</a:t>
             </a:r>
-            <a:endParaRPr lang="en-US" sz="1600" dirty="0">
+            <a:endParaRPr lang="en-US" baseline="-25000" dirty="0">
               <a:latin typeface="Baskerville Old Face" panose="02020602080505020303" pitchFamily="18" charset="0"/>
               <a:cs typeface="Arabic Typesetting" panose="03020402040406030203" pitchFamily="66" charset="-78"/>
             </a:endParaRPr>
@@ -5588,10 +6061,10 @@
       </p:sp>
       <p:sp>
         <p:nvSpPr>
-          <p:cNvPr id="124" name="BlokTextu 123">
-            <a:extLst>
-              <a:ext uri="{FF2B5EF4-FFF2-40B4-BE49-F238E27FC236}">
-                <a16:creationId xmlns:a16="http://schemas.microsoft.com/office/drawing/2014/main" id="{A7104031-284C-D084-2066-72E9DFB9C9A3}"/>
+          <p:cNvPr id="125" name="BlokTextu 124">
+            <a:extLst>
+              <a:ext uri="{FF2B5EF4-FFF2-40B4-BE49-F238E27FC236}">
+                <a16:creationId xmlns:a16="http://schemas.microsoft.com/office/drawing/2014/main" id="{37BCBEC2-4EF5-3EA5-C0E7-5EB5921A2FBA}"/>
               </a:ext>
             </a:extLst>
           </p:cNvPr>
@@ -5600,8 +6073,8 @@
         </p:nvSpPr>
         <p:spPr>
           <a:xfrm>
-            <a:off x="10524206" y="2385750"/>
-            <a:ext cx="369012" cy="523220"/>
+            <a:off x="8001854" y="3788374"/>
+            <a:ext cx="906017" cy="523220"/>
           </a:xfrm>
           <a:prstGeom prst="rect">
             <a:avLst/>
@@ -5621,54 +6094,40 @@
               </a:rPr>
               <a:t>u</a:t>
             </a:r>
-            <a:endParaRPr lang="en-US" baseline="-25000" dirty="0">
-              <a:latin typeface="Baskerville Old Face" panose="02020602080505020303" pitchFamily="18" charset="0"/>
-              <a:cs typeface="Arabic Typesetting" panose="03020402040406030203" pitchFamily="66" charset="-78"/>
-            </a:endParaRPr>
-          </a:p>
-        </p:txBody>
-      </p:sp>
-      <p:sp>
-        <p:nvSpPr>
-          <p:cNvPr id="125" name="BlokTextu 124">
-            <a:extLst>
-              <a:ext uri="{FF2B5EF4-FFF2-40B4-BE49-F238E27FC236}">
-                <a16:creationId xmlns:a16="http://schemas.microsoft.com/office/drawing/2014/main" id="{37BCBEC2-4EF5-3EA5-C0E7-5EB5921A2FBA}"/>
-              </a:ext>
-            </a:extLst>
-          </p:cNvPr>
-          <p:cNvSpPr txBox="1"/>
-          <p:nvPr/>
-        </p:nvSpPr>
-        <p:spPr>
-          <a:xfrm>
-            <a:off x="8285210" y="3736496"/>
-            <a:ext cx="514885" cy="523220"/>
-          </a:xfrm>
-          <a:prstGeom prst="rect">
-            <a:avLst/>
-          </a:prstGeom>
-          <a:noFill/>
-        </p:spPr>
-        <p:txBody>
-          <a:bodyPr wrap="none" rtlCol="0">
-            <a:spAutoFit/>
-          </a:bodyPr>
-          <a:lstStyle/>
-          <a:p>
-            <a:r>
-              <a:rPr lang="en-US" sz="2800" i="1" dirty="0">
-                <a:latin typeface="Baskerville Old Face" panose="02020602080505020303" pitchFamily="18" charset="0"/>
-                <a:cs typeface="Arabic Typesetting" panose="03020402040406030203" pitchFamily="66" charset="-78"/>
-              </a:rPr>
-              <a:t>u</a:t>
-            </a:r>
             <a:r>
               <a:rPr lang="en-US" sz="2800" baseline="-25000" dirty="0">
                 <a:latin typeface="Baskerville Old Face" panose="02020602080505020303" pitchFamily="18" charset="0"/>
                 <a:cs typeface="Arabic Typesetting" panose="03020402040406030203" pitchFamily="66" charset="-78"/>
               </a:rPr>
               <a:t>L</a:t>
+            </a:r>
+            <a:r>
+              <a:rPr lang="sk-SK" sz="1800" dirty="0">
+                <a:latin typeface="Baskerville Old Face" panose="02020602080505020303" pitchFamily="18" charset="0"/>
+                <a:cs typeface="Arabic Typesetting" panose="03020402040406030203" pitchFamily="66" charset="-78"/>
+              </a:rPr>
+              <a:t> </a:t>
+            </a:r>
+            <a:r>
+              <a:rPr lang="sk-SK" sz="2400" dirty="0">
+                <a:latin typeface="Baskerville Old Face" panose="02020602080505020303" pitchFamily="18" charset="0"/>
+                <a:cs typeface="Arabic Typesetting" panose="03020402040406030203" pitchFamily="66" charset="-78"/>
+              </a:rPr>
+              <a:t>(</a:t>
+            </a:r>
+            <a:r>
+              <a:rPr lang="sk-SK" sz="2400" i="1" dirty="0">
+                <a:latin typeface="Baskerville Old Face" panose="02020602080505020303" pitchFamily="18" charset="0"/>
+                <a:cs typeface="Arabic Typesetting" panose="03020402040406030203" pitchFamily="66" charset="-78"/>
+              </a:rPr>
+              <a:t>k</a:t>
+            </a:r>
+            <a:r>
+              <a:rPr lang="sk-SK" sz="2400" dirty="0">
+                <a:latin typeface="Baskerville Old Face" panose="02020602080505020303" pitchFamily="18" charset="0"/>
+                <a:cs typeface="Arabic Typesetting" panose="03020402040406030203" pitchFamily="66" charset="-78"/>
+              </a:rPr>
+              <a:t>)</a:t>
             </a:r>
             <a:endParaRPr lang="en-US" baseline="-25000" dirty="0">
               <a:latin typeface="Baskerville Old Face" panose="02020602080505020303" pitchFamily="18" charset="0"/>
@@ -5694,7 +6153,7 @@
         <p:spPr>
           <a:xfrm flipH="1">
             <a:off x="3446082" y="1836330"/>
-            <a:ext cx="3201572" cy="0"/>
+            <a:ext cx="3096000" cy="0"/>
           </a:xfrm>
           <a:prstGeom prst="line">
             <a:avLst/>
@@ -5736,7 +6195,7 @@
         </p:nvCxnSpPr>
         <p:spPr>
           <a:xfrm>
-            <a:off x="6647654" y="1836330"/>
+            <a:off x="6540137" y="1836330"/>
             <a:ext cx="2539" cy="424399"/>
           </a:xfrm>
           <a:prstGeom prst="straightConnector1">
@@ -5821,7 +6280,7 @@
         </p:nvGrpSpPr>
         <p:grpSpPr>
           <a:xfrm>
-            <a:off x="8418145" y="2242464"/>
+            <a:off x="8112586" y="2293790"/>
             <a:ext cx="1765883" cy="1334080"/>
             <a:chOff x="6004039" y="2547708"/>
             <a:chExt cx="2077047" cy="769357"/>
@@ -5938,8 +6397,8 @@
         </p:nvCxnSpPr>
         <p:spPr>
           <a:xfrm>
-            <a:off x="288346" y="3105830"/>
-            <a:ext cx="1620000" cy="0"/>
+            <a:off x="1047683" y="3146470"/>
+            <a:ext cx="1120124" cy="0"/>
           </a:xfrm>
           <a:prstGeom prst="straightConnector1">
             <a:avLst/>
@@ -5980,8 +6439,8 @@
         </p:nvSpPr>
         <p:spPr>
           <a:xfrm>
-            <a:off x="623031" y="2634832"/>
-            <a:ext cx="1148071" cy="461665"/>
+            <a:off x="1038158" y="2684805"/>
+            <a:ext cx="1056700" cy="461665"/>
           </a:xfrm>
           <a:prstGeom prst="rect">
             <a:avLst/>
@@ -6016,21 +6475,21 @@
               <a:t> </a:t>
             </a:r>
             <a:r>
-              <a:rPr lang="sk-SK" sz="2400" dirty="0">
+              <a:rPr lang="sk-SK" sz="2000" dirty="0">
                 <a:latin typeface="Baskerville Old Face" panose="02020602080505020303" pitchFamily="18" charset="0"/>
                 <a:cs typeface="Arabic Typesetting" panose="03020402040406030203" pitchFamily="66" charset="-78"/>
               </a:rPr>
               <a:t>(</a:t>
             </a:r>
             <a:r>
-              <a:rPr lang="sk-SK" sz="2400" i="1" dirty="0">
+              <a:rPr lang="sk-SK" sz="2000" i="1" dirty="0">
                 <a:latin typeface="Baskerville Old Face" panose="02020602080505020303" pitchFamily="18" charset="0"/>
                 <a:cs typeface="Arabic Typesetting" panose="03020402040406030203" pitchFamily="66" charset="-78"/>
               </a:rPr>
               <a:t>k-1</a:t>
             </a:r>
             <a:r>
-              <a:rPr lang="sk-SK" sz="2400" dirty="0">
+              <a:rPr lang="sk-SK" sz="2000" dirty="0">
                 <a:latin typeface="Baskerville Old Face" panose="02020602080505020303" pitchFamily="18" charset="0"/>
                 <a:cs typeface="Arabic Typesetting" panose="03020402040406030203" pitchFamily="66" charset="-78"/>
               </a:rPr>
@@ -6174,7 +6633,7 @@
         </p:nvCxnSpPr>
         <p:spPr>
           <a:xfrm flipV="1">
-            <a:off x="9722697" y="3576544"/>
+            <a:off x="9119193" y="3627870"/>
             <a:ext cx="0" cy="795663"/>
           </a:xfrm>
           <a:prstGeom prst="straightConnector1">
@@ -6216,8 +6675,8 @@
         </p:nvSpPr>
         <p:spPr>
           <a:xfrm>
-            <a:off x="9195270" y="3740361"/>
-            <a:ext cx="524503" cy="523220"/>
+            <a:off x="9119193" y="3744723"/>
+            <a:ext cx="934871" cy="523220"/>
           </a:xfrm>
           <a:prstGeom prst="rect">
             <a:avLst/>
@@ -6244,6 +6703,57 @@
               </a:rPr>
               <a:t>R</a:t>
             </a:r>
+            <a:r>
+              <a:rPr kumimoji="0" lang="sk-SK" sz="2400" b="0" i="0" u="none" strike="noStrike" kern="1200" cap="none" spc="0" normalizeH="0" baseline="0" noProof="0" dirty="0">
+                <a:ln>
+                  <a:noFill/>
+                </a:ln>
+                <a:solidFill>
+                  <a:prstClr val="black"/>
+                </a:solidFill>
+                <a:effectLst/>
+                <a:uLnTx/>
+                <a:uFillTx/>
+                <a:latin typeface="Baskerville Old Face" panose="02020602080505020303" pitchFamily="18" charset="0"/>
+                <a:ea typeface="+mn-ea"/>
+                <a:cs typeface="Arabic Typesetting" panose="03020402040406030203" pitchFamily="66" charset="-78"/>
+              </a:rPr>
+              <a:t> (</a:t>
+            </a:r>
+            <a:r>
+              <a:rPr kumimoji="0" lang="sk-SK" sz="2400" b="0" i="1" u="none" strike="noStrike" kern="1200" cap="none" spc="0" normalizeH="0" baseline="0" noProof="0" dirty="0">
+                <a:ln>
+                  <a:noFill/>
+                </a:ln>
+                <a:solidFill>
+                  <a:prstClr val="black"/>
+                </a:solidFill>
+                <a:effectLst/>
+                <a:uLnTx/>
+                <a:uFillTx/>
+                <a:latin typeface="Baskerville Old Face" panose="02020602080505020303" pitchFamily="18" charset="0"/>
+                <a:ea typeface="+mn-ea"/>
+                <a:cs typeface="Arabic Typesetting" panose="03020402040406030203" pitchFamily="66" charset="-78"/>
+              </a:rPr>
+              <a:t>k</a:t>
+            </a:r>
+            <a:r>
+              <a:rPr kumimoji="0" lang="sk-SK" sz="2400" b="0" i="0" u="none" strike="noStrike" kern="1200" cap="none" spc="0" normalizeH="0" baseline="0" noProof="0" dirty="0">
+                <a:ln>
+                  <a:noFill/>
+                </a:ln>
+                <a:solidFill>
+                  <a:prstClr val="black"/>
+                </a:solidFill>
+                <a:effectLst/>
+                <a:uLnTx/>
+                <a:uFillTx/>
+                <a:latin typeface="Baskerville Old Face" panose="02020602080505020303" pitchFamily="18" charset="0"/>
+                <a:ea typeface="+mn-ea"/>
+                <a:cs typeface="Arabic Typesetting" panose="03020402040406030203" pitchFamily="66" charset="-78"/>
+              </a:rPr>
+              <a:t>)</a:t>
+            </a:r>
             <a:endParaRPr lang="en-US" baseline="-25000" dirty="0">
               <a:latin typeface="Baskerville Old Face" panose="02020602080505020303" pitchFamily="18" charset="0"/>
               <a:cs typeface="Arabic Typesetting" panose="03020402040406030203" pitchFamily="66" charset="-78"/>
@@ -6265,7 +6775,7 @@
         </p:nvGrpSpPr>
         <p:grpSpPr>
           <a:xfrm>
-            <a:off x="6012960" y="2274422"/>
+            <a:off x="5860308" y="2274422"/>
             <a:ext cx="1307747" cy="1334080"/>
             <a:chOff x="6004039" y="2547708"/>
             <a:chExt cx="1538183" cy="769357"/>
@@ -6381,7 +6891,7 @@
         <p:spPr>
           <a:xfrm flipV="1">
             <a:off x="4915523" y="2903752"/>
-            <a:ext cx="1080000" cy="2308"/>
+            <a:ext cx="936000" cy="2308"/>
           </a:xfrm>
           <a:prstGeom prst="straightConnector1">
             <a:avLst/>
@@ -6422,8 +6932,8 @@
         </p:nvSpPr>
         <p:spPr>
           <a:xfrm>
-            <a:off x="1914442" y="2518445"/>
-            <a:ext cx="593737" cy="737261"/>
+            <a:off x="2182568" y="2518445"/>
+            <a:ext cx="325611" cy="737261"/>
           </a:xfrm>
           <a:prstGeom prst="rect">
             <a:avLst/>
@@ -6575,7 +7085,7 @@
           <a:lstStyle/>
           <a:p>
             <a:r>
-              <a:rPr lang="en-US" sz="2400" i="1" dirty="0">
+              <a:rPr lang="en-US" sz="2400" dirty="0">
                 <a:latin typeface="Baskerville Old Face" panose="02020602080505020303" pitchFamily="18" charset="0"/>
                 <a:cs typeface="Arabic Typesetting" panose="03020402040406030203" pitchFamily="66" charset="-78"/>
               </a:rPr>
@@ -6610,7 +7120,7 @@
         </p:nvCxnSpPr>
         <p:spPr>
           <a:xfrm flipV="1">
-            <a:off x="6647654" y="3608502"/>
+            <a:off x="6538392" y="3608502"/>
             <a:ext cx="0" cy="795663"/>
           </a:xfrm>
           <a:prstGeom prst="straightConnector1">
@@ -6638,12 +7148,123 @@
           </a:fontRef>
         </p:style>
       </p:cxnSp>
-      <p:sp>
-        <p:nvSpPr>
-          <p:cNvPr id="28" name="BlokTextu 27">
-            <a:extLst>
-              <a:ext uri="{FF2B5EF4-FFF2-40B4-BE49-F238E27FC236}">
-                <a16:creationId xmlns:a16="http://schemas.microsoft.com/office/drawing/2014/main" id="{15DD279E-DBAA-1D1E-7660-3726E81D8102}"/>
+      <mc:AlternateContent xmlns:mc="http://schemas.openxmlformats.org/markup-compatibility/2006" xmlns:a14="http://schemas.microsoft.com/office/drawing/2010/main">
+        <mc:Choice Requires="a14">
+          <p:sp>
+            <p:nvSpPr>
+              <p:cNvPr id="28" name="BlokTextu 27">
+                <a:extLst>
+                  <a:ext uri="{FF2B5EF4-FFF2-40B4-BE49-F238E27FC236}">
+                    <a16:creationId xmlns:a16="http://schemas.microsoft.com/office/drawing/2014/main" id="{15DD279E-DBAA-1D1E-7660-3726E81D8102}"/>
+                  </a:ext>
+                </a:extLst>
+              </p:cNvPr>
+              <p:cNvSpPr txBox="1"/>
+              <p:nvPr/>
+            </p:nvSpPr>
+            <p:spPr>
+              <a:xfrm>
+                <a:off x="6021365" y="3765609"/>
+                <a:ext cx="497251" cy="453137"/>
+              </a:xfrm>
+              <a:prstGeom prst="rect">
+                <a:avLst/>
+              </a:prstGeom>
+              <a:noFill/>
+            </p:spPr>
+            <p:txBody>
+              <a:bodyPr wrap="none" rtlCol="0">
+                <a:spAutoFit/>
+              </a:bodyPr>
+              <a:lstStyle/>
+              <a:p>
+                <a:pPr/>
+                <a14:m>
+                  <m:oMathPara xmlns:m="http://schemas.openxmlformats.org/officeDocument/2006/math">
+                    <m:oMathParaPr>
+                      <m:jc m:val="centerGroup"/>
+                    </m:oMathParaPr>
+                    <m:oMath xmlns:m="http://schemas.openxmlformats.org/officeDocument/2006/math">
+                      <m:r>
+                        <a:rPr lang="el-GR" sz="2400" i="1" smtClean="0">
+                          <a:latin typeface="Cambria Math" panose="02040503050406030204" pitchFamily="18" charset="0"/>
+                          <a:ea typeface="Calibri" panose="020F0502020204030204" pitchFamily="34" charset="0"/>
+                          <a:cs typeface="Calibri" panose="020F0502020204030204" pitchFamily="34" charset="0"/>
+                        </a:rPr>
+                        <m:t>𝜌</m:t>
+                      </m:r>
+                      <m:r>
+                        <m:rPr>
+                          <m:sty m:val="p"/>
+                        </m:rPr>
+                        <a:rPr lang="sk-SK" sz="2400" b="0" i="0" baseline="-25000" smtClean="0">
+                          <a:latin typeface="Cambria Math" panose="02040503050406030204" pitchFamily="18" charset="0"/>
+                          <a:ea typeface="Calibri" panose="020F0502020204030204" pitchFamily="34" charset="0"/>
+                          <a:cs typeface="Calibri" panose="020F0502020204030204" pitchFamily="34" charset="0"/>
+                        </a:rPr>
+                        <m:t>s</m:t>
+                      </m:r>
+                    </m:oMath>
+                  </m:oMathPara>
+                </a14:m>
+                <a:endParaRPr lang="en-US" sz="2400" baseline="-25000" dirty="0">
+                  <a:latin typeface="Baskerville Old Face" panose="02020602080505020303" pitchFamily="18" charset="0"/>
+                </a:endParaRPr>
+              </a:p>
+            </p:txBody>
+          </p:sp>
+        </mc:Choice>
+        <mc:Fallback xmlns="">
+          <p:sp>
+            <p:nvSpPr>
+              <p:cNvPr id="28" name="BlokTextu 27">
+                <a:extLst>
+                  <a:ext uri="{FF2B5EF4-FFF2-40B4-BE49-F238E27FC236}">
+                    <a16:creationId xmlns:a16="http://schemas.microsoft.com/office/drawing/2014/main" id="{15DD279E-DBAA-1D1E-7660-3726E81D8102}"/>
+                  </a:ext>
+                </a:extLst>
+              </p:cNvPr>
+              <p:cNvSpPr txBox="1">
+                <a:spLocks noRot="1" noChangeAspect="1" noMove="1" noResize="1" noEditPoints="1" noAdjustHandles="1" noChangeArrowheads="1" noChangeShapeType="1" noTextEdit="1"/>
+              </p:cNvSpPr>
+              <p:nvPr/>
+            </p:nvSpPr>
+            <p:spPr>
+              <a:xfrm>
+                <a:off x="6021365" y="3765609"/>
+                <a:ext cx="497251" cy="453137"/>
+              </a:xfrm>
+              <a:prstGeom prst="rect">
+                <a:avLst/>
+              </a:prstGeom>
+              <a:blipFill>
+                <a:blip r:embed="rId2"/>
+                <a:stretch>
+                  <a:fillRect b="-13514"/>
+                </a:stretch>
+              </a:blipFill>
+            </p:spPr>
+            <p:txBody>
+              <a:bodyPr/>
+              <a:lstStyle/>
+              <a:p>
+                <a:r>
+                  <a:rPr lang="en-US">
+                    <a:noFill/>
+                  </a:rPr>
+                  <a:t> </a:t>
+                </a:r>
+              </a:p>
+            </p:txBody>
+          </p:sp>
+        </mc:Fallback>
+      </mc:AlternateContent>
+      <p:sp>
+        <p:nvSpPr>
+          <p:cNvPr id="29" name="BlokTextu 28">
+            <a:extLst>
+              <a:ext uri="{FF2B5EF4-FFF2-40B4-BE49-F238E27FC236}">
+                <a16:creationId xmlns:a16="http://schemas.microsoft.com/office/drawing/2014/main" id="{530B91E8-FEF5-3FA3-C706-F5308CE37A88}"/>
               </a:ext>
             </a:extLst>
           </p:cNvPr>
@@ -6652,8 +7273,8 @@
         </p:nvSpPr>
         <p:spPr>
           <a:xfrm>
-            <a:off x="6264226" y="3812206"/>
-            <a:ext cx="421910" cy="461665"/>
+            <a:off x="2494139" y="2400892"/>
+            <a:ext cx="942887" cy="461665"/>
           </a:xfrm>
           <a:prstGeom prst="rect">
             <a:avLst/>
@@ -6667,55 +7288,7 @@
           <a:lstStyle/>
           <a:p>
             <a:r>
-              <a:rPr lang="el-GR" sz="2400" i="1" dirty="0">
-                <a:ea typeface="Calibri" panose="020F0502020204030204" pitchFamily="34" charset="0"/>
-                <a:cs typeface="Calibri" panose="020F0502020204030204" pitchFamily="34" charset="0"/>
-              </a:rPr>
-              <a:t>ρ</a:t>
-            </a:r>
-            <a:r>
-              <a:rPr lang="sk-SK" sz="2400" baseline="-25000" dirty="0">
-                <a:ea typeface="Calibri" panose="020F0502020204030204" pitchFamily="34" charset="0"/>
-                <a:cs typeface="Calibri" panose="020F0502020204030204" pitchFamily="34" charset="0"/>
-              </a:rPr>
-              <a:t>s</a:t>
-            </a:r>
-            <a:endParaRPr lang="en-US" sz="2400" baseline="-25000" dirty="0">
-              <a:latin typeface="Baskerville Old Face" panose="02020602080505020303" pitchFamily="18" charset="0"/>
-            </a:endParaRPr>
-          </a:p>
-        </p:txBody>
-      </p:sp>
-      <p:sp>
-        <p:nvSpPr>
-          <p:cNvPr id="29" name="BlokTextu 28">
-            <a:extLst>
-              <a:ext uri="{FF2B5EF4-FFF2-40B4-BE49-F238E27FC236}">
-                <a16:creationId xmlns:a16="http://schemas.microsoft.com/office/drawing/2014/main" id="{530B91E8-FEF5-3FA3-C706-F5308CE37A88}"/>
-              </a:ext>
-            </a:extLst>
-          </p:cNvPr>
-          <p:cNvSpPr txBox="1"/>
-          <p:nvPr/>
-        </p:nvSpPr>
-        <p:spPr>
-          <a:xfrm>
-            <a:off x="2499798" y="2433288"/>
-            <a:ext cx="997389" cy="461665"/>
-          </a:xfrm>
-          <a:prstGeom prst="rect">
-            <a:avLst/>
-          </a:prstGeom>
-          <a:noFill/>
-        </p:spPr>
-        <p:txBody>
-          <a:bodyPr wrap="none" rtlCol="0">
-            <a:spAutoFit/>
-          </a:bodyPr>
-          <a:lstStyle/>
-          <a:p>
-            <a:r>
-              <a:rPr lang="en-US" sz="2400" i="1" dirty="0">
+              <a:rPr lang="en-US" sz="2400" dirty="0">
                 <a:latin typeface="Baskerville Old Face" panose="02020602080505020303" pitchFamily="18" charset="0"/>
                 <a:cs typeface="Arabic Typesetting" panose="03020402040406030203" pitchFamily="66" charset="-78"/>
               </a:rPr>
@@ -6736,21 +7309,21 @@
               <a:t> </a:t>
             </a:r>
             <a:r>
-              <a:rPr lang="sk-SK" sz="2400" dirty="0">
+              <a:rPr lang="sk-SK" sz="2000" dirty="0">
                 <a:latin typeface="Baskerville Old Face" panose="02020602080505020303" pitchFamily="18" charset="0"/>
                 <a:cs typeface="Arabic Typesetting" panose="03020402040406030203" pitchFamily="66" charset="-78"/>
               </a:rPr>
               <a:t>(</a:t>
             </a:r>
             <a:r>
-              <a:rPr lang="sk-SK" sz="2400" i="1" dirty="0">
+              <a:rPr lang="sk-SK" sz="2000" i="1" dirty="0">
                 <a:latin typeface="Baskerville Old Face" panose="02020602080505020303" pitchFamily="18" charset="0"/>
                 <a:cs typeface="Arabic Typesetting" panose="03020402040406030203" pitchFamily="66" charset="-78"/>
               </a:rPr>
               <a:t>k</a:t>
             </a:r>
             <a:r>
-              <a:rPr lang="sk-SK" sz="2400" dirty="0">
+              <a:rPr lang="sk-SK" sz="2000" dirty="0">
                 <a:latin typeface="Baskerville Old Face" panose="02020602080505020303" pitchFamily="18" charset="0"/>
                 <a:cs typeface="Arabic Typesetting" panose="03020402040406030203" pitchFamily="66" charset="-78"/>
               </a:rPr>
@@ -6763,94 +7336,460 @@
           </a:p>
         </p:txBody>
       </p:sp>
-      <p:sp>
-        <p:nvSpPr>
-          <p:cNvPr id="30" name="BlokTextu 29">
-            <a:extLst>
-              <a:ext uri="{FF2B5EF4-FFF2-40B4-BE49-F238E27FC236}">
-                <a16:creationId xmlns:a16="http://schemas.microsoft.com/office/drawing/2014/main" id="{1691B43D-5F9B-D683-5384-2D547B258672}"/>
-              </a:ext>
-            </a:extLst>
-          </p:cNvPr>
-          <p:cNvSpPr txBox="1"/>
+      <mc:AlternateContent xmlns:mc="http://schemas.openxmlformats.org/markup-compatibility/2006" xmlns:a14="http://schemas.microsoft.com/office/drawing/2010/main">
+        <mc:Choice Requires="a14">
+          <p:sp>
+            <p:nvSpPr>
+              <p:cNvPr id="30" name="BlokTextu 29">
+                <a:extLst>
+                  <a:ext uri="{FF2B5EF4-FFF2-40B4-BE49-F238E27FC236}">
+                    <a16:creationId xmlns:a16="http://schemas.microsoft.com/office/drawing/2014/main" id="{1691B43D-5F9B-D683-5384-2D547B258672}"/>
+                  </a:ext>
+                </a:extLst>
+              </p:cNvPr>
+              <p:cNvSpPr txBox="1"/>
+              <p:nvPr/>
+            </p:nvSpPr>
+            <p:spPr>
+              <a:xfrm>
+                <a:off x="5007814" y="2405157"/>
+                <a:ext cx="742511" cy="453137"/>
+              </a:xfrm>
+              <a:prstGeom prst="rect">
+                <a:avLst/>
+              </a:prstGeom>
+              <a:noFill/>
+            </p:spPr>
+            <p:txBody>
+              <a:bodyPr wrap="none" rtlCol="0">
+                <a:spAutoFit/>
+              </a:bodyPr>
+              <a:lstStyle/>
+              <a:p>
+                <a:pPr/>
+                <a14:m>
+                  <m:oMathPara xmlns:m="http://schemas.openxmlformats.org/officeDocument/2006/math">
+                    <m:oMathParaPr>
+                      <m:jc m:val="centerGroup"/>
+                    </m:oMathParaPr>
+                    <m:oMath xmlns:m="http://schemas.openxmlformats.org/officeDocument/2006/math">
+                      <m:r>
+                        <a:rPr lang="el-GR" sz="2400" i="1" smtClean="0">
+                          <a:latin typeface="Cambria Math" panose="02040503050406030204" pitchFamily="18" charset="0"/>
+                          <a:ea typeface="Calibri" panose="020F0502020204030204" pitchFamily="34" charset="0"/>
+                          <a:cs typeface="Calibri" panose="020F0502020204030204" pitchFamily="34" charset="0"/>
+                        </a:rPr>
+                        <m:t>𝜌</m:t>
+                      </m:r>
+                      <m:r>
+                        <m:rPr>
+                          <m:nor/>
+                        </m:rPr>
+                        <a:rPr lang="sk-SK" sz="2400" dirty="0">
+                          <a:latin typeface="Baskerville Old Face" panose="02020602080505020303" pitchFamily="18" charset="0"/>
+                          <a:cs typeface="Arabic Typesetting" panose="03020402040406030203" pitchFamily="66" charset="-78"/>
+                        </a:rPr>
+                        <m:t>(</m:t>
+                      </m:r>
+                      <m:r>
+                        <m:rPr>
+                          <m:nor/>
+                        </m:rPr>
+                        <a:rPr lang="sk-SK" sz="2400" i="1" dirty="0">
+                          <a:latin typeface="Baskerville Old Face" panose="02020602080505020303" pitchFamily="18" charset="0"/>
+                          <a:cs typeface="Arabic Typesetting" panose="03020402040406030203" pitchFamily="66" charset="-78"/>
+                        </a:rPr>
+                        <m:t>k</m:t>
+                      </m:r>
+                      <m:r>
+                        <m:rPr>
+                          <m:nor/>
+                        </m:rPr>
+                        <a:rPr lang="sk-SK" sz="2400" dirty="0">
+                          <a:latin typeface="Baskerville Old Face" panose="02020602080505020303" pitchFamily="18" charset="0"/>
+                          <a:cs typeface="Arabic Typesetting" panose="03020402040406030203" pitchFamily="66" charset="-78"/>
+                        </a:rPr>
+                        <m:t>)</m:t>
+                      </m:r>
+                    </m:oMath>
+                  </m:oMathPara>
+                </a14:m>
+                <a:endParaRPr lang="en-US" sz="2400" baseline="-25000" dirty="0">
+                  <a:latin typeface="Baskerville Old Face" panose="02020602080505020303" pitchFamily="18" charset="0"/>
+                </a:endParaRPr>
+              </a:p>
+            </p:txBody>
+          </p:sp>
+        </mc:Choice>
+        <mc:Fallback xmlns="">
+          <p:sp>
+            <p:nvSpPr>
+              <p:cNvPr id="30" name="BlokTextu 29">
+                <a:extLst>
+                  <a:ext uri="{FF2B5EF4-FFF2-40B4-BE49-F238E27FC236}">
+                    <a16:creationId xmlns:a16="http://schemas.microsoft.com/office/drawing/2014/main" id="{1691B43D-5F9B-D683-5384-2D547B258672}"/>
+                  </a:ext>
+                </a:extLst>
+              </p:cNvPr>
+              <p:cNvSpPr txBox="1">
+                <a:spLocks noRot="1" noChangeAspect="1" noMove="1" noResize="1" noEditPoints="1" noAdjustHandles="1" noChangeArrowheads="1" noChangeShapeType="1" noTextEdit="1"/>
+              </p:cNvSpPr>
+              <p:nvPr/>
+            </p:nvSpPr>
+            <p:spPr>
+              <a:xfrm>
+                <a:off x="5007814" y="2405157"/>
+                <a:ext cx="742511" cy="453137"/>
+              </a:xfrm>
+              <a:prstGeom prst="rect">
+                <a:avLst/>
+              </a:prstGeom>
+              <a:blipFill>
+                <a:blip r:embed="rId3"/>
+                <a:stretch>
+                  <a:fillRect r="-1639" b="-13514"/>
+                </a:stretch>
+              </a:blipFill>
+            </p:spPr>
+            <p:txBody>
+              <a:bodyPr/>
+              <a:lstStyle/>
+              <a:p>
+                <a:r>
+                  <a:rPr lang="en-US">
+                    <a:noFill/>
+                  </a:rPr>
+                  <a:t> </a:t>
+                </a:r>
+              </a:p>
+            </p:txBody>
+          </p:sp>
+        </mc:Fallback>
+      </mc:AlternateContent>
+      <mc:AlternateContent xmlns:mc="http://schemas.openxmlformats.org/markup-compatibility/2006" xmlns:a14="http://schemas.microsoft.com/office/drawing/2010/main">
+        <mc:Choice Requires="a14">
+          <p:sp>
+            <p:nvSpPr>
+              <p:cNvPr id="33" name="BlokTextu 32">
+                <a:extLst>
+                  <a:ext uri="{FF2B5EF4-FFF2-40B4-BE49-F238E27FC236}">
+                    <a16:creationId xmlns:a16="http://schemas.microsoft.com/office/drawing/2014/main" id="{48A33A04-DEFD-DF7E-F09E-A471106192EC}"/>
+                  </a:ext>
+                </a:extLst>
+              </p:cNvPr>
+              <p:cNvSpPr txBox="1"/>
+              <p:nvPr/>
+            </p:nvSpPr>
+            <p:spPr>
+              <a:xfrm>
+                <a:off x="7288682" y="2419445"/>
+                <a:ext cx="746295" cy="453137"/>
+              </a:xfrm>
+              <a:prstGeom prst="rect">
+                <a:avLst/>
+              </a:prstGeom>
+              <a:noFill/>
+            </p:spPr>
+            <p:txBody>
+              <a:bodyPr wrap="none" rtlCol="0">
+                <a:spAutoFit/>
+              </a:bodyPr>
+              <a:lstStyle/>
+              <a:p>
+                <a:pPr/>
+                <a14:m>
+                  <m:oMathPara xmlns:m="http://schemas.openxmlformats.org/officeDocument/2006/math">
+                    <m:oMathParaPr>
+                      <m:jc m:val="centerGroup"/>
+                    </m:oMathParaPr>
+                    <m:oMath xmlns:m="http://schemas.openxmlformats.org/officeDocument/2006/math">
+                      <m:acc>
+                        <m:accPr>
+                          <m:chr m:val="̃"/>
+                          <m:ctrlPr>
+                            <a:rPr lang="el-GR" sz="2400" i="1" smtClean="0">
+                              <a:highlight>
+                                <a:srgbClr val="FFFF00"/>
+                              </a:highlight>
+                              <a:latin typeface="Cambria Math" panose="02040503050406030204" pitchFamily="18" charset="0"/>
+                              <a:ea typeface="Calibri" panose="020F0502020204030204" pitchFamily="34" charset="0"/>
+                              <a:cs typeface="Calibri" panose="020F0502020204030204" pitchFamily="34" charset="0"/>
+                            </a:rPr>
+                          </m:ctrlPr>
+                        </m:accPr>
+                        <m:e>
+                          <m:r>
+                            <a:rPr lang="el-GR" sz="2400" i="1">
+                              <a:latin typeface="Cambria Math" panose="02040503050406030204" pitchFamily="18" charset="0"/>
+                              <a:ea typeface="Calibri" panose="020F0502020204030204" pitchFamily="34" charset="0"/>
+                              <a:cs typeface="Calibri" panose="020F0502020204030204" pitchFamily="34" charset="0"/>
+                            </a:rPr>
+                            <m:t>𝜌</m:t>
+                          </m:r>
+                        </m:e>
+                      </m:acc>
+                      <m:r>
+                        <m:rPr>
+                          <m:nor/>
+                        </m:rPr>
+                        <a:rPr lang="sk-SK" sz="2400" dirty="0">
+                          <a:latin typeface="Baskerville Old Face" panose="02020602080505020303" pitchFamily="18" charset="0"/>
+                          <a:cs typeface="Arabic Typesetting" panose="03020402040406030203" pitchFamily="66" charset="-78"/>
+                        </a:rPr>
+                        <m:t>(</m:t>
+                      </m:r>
+                      <m:r>
+                        <m:rPr>
+                          <m:nor/>
+                        </m:rPr>
+                        <a:rPr lang="sk-SK" sz="2400" i="1" dirty="0">
+                          <a:latin typeface="Baskerville Old Face" panose="02020602080505020303" pitchFamily="18" charset="0"/>
+                          <a:cs typeface="Arabic Typesetting" panose="03020402040406030203" pitchFamily="66" charset="-78"/>
+                        </a:rPr>
+                        <m:t>k</m:t>
+                      </m:r>
+                      <m:r>
+                        <m:rPr>
+                          <m:nor/>
+                        </m:rPr>
+                        <a:rPr lang="sk-SK" sz="2400" dirty="0">
+                          <a:latin typeface="Baskerville Old Face" panose="02020602080505020303" pitchFamily="18" charset="0"/>
+                          <a:cs typeface="Arabic Typesetting" panose="03020402040406030203" pitchFamily="66" charset="-78"/>
+                        </a:rPr>
+                        <m:t>)</m:t>
+                      </m:r>
+                    </m:oMath>
+                  </m:oMathPara>
+                </a14:m>
+                <a:endParaRPr lang="en-US" sz="2400" baseline="-25000" dirty="0">
+                  <a:latin typeface="Baskerville Old Face" panose="02020602080505020303" pitchFamily="18" charset="0"/>
+                </a:endParaRPr>
+              </a:p>
+            </p:txBody>
+          </p:sp>
+        </mc:Choice>
+        <mc:Fallback xmlns="">
+          <p:sp>
+            <p:nvSpPr>
+              <p:cNvPr id="33" name="BlokTextu 32">
+                <a:extLst>
+                  <a:ext uri="{FF2B5EF4-FFF2-40B4-BE49-F238E27FC236}">
+                    <a16:creationId xmlns:a16="http://schemas.microsoft.com/office/drawing/2014/main" id="{48A33A04-DEFD-DF7E-F09E-A471106192EC}"/>
+                  </a:ext>
+                </a:extLst>
+              </p:cNvPr>
+              <p:cNvSpPr txBox="1">
+                <a:spLocks noRot="1" noChangeAspect="1" noMove="1" noResize="1" noEditPoints="1" noAdjustHandles="1" noChangeArrowheads="1" noChangeShapeType="1" noTextEdit="1"/>
+              </p:cNvSpPr>
+              <p:nvPr/>
+            </p:nvSpPr>
+            <p:spPr>
+              <a:xfrm>
+                <a:off x="7288682" y="2419445"/>
+                <a:ext cx="746295" cy="453137"/>
+              </a:xfrm>
+              <a:prstGeom prst="rect">
+                <a:avLst/>
+              </a:prstGeom>
+              <a:blipFill>
+                <a:blip r:embed="rId4"/>
+                <a:stretch>
+                  <a:fillRect r="-2459" b="-13514"/>
+                </a:stretch>
+              </a:blipFill>
+            </p:spPr>
+            <p:txBody>
+              <a:bodyPr/>
+              <a:lstStyle/>
+              <a:p>
+                <a:r>
+                  <a:rPr lang="en-US">
+                    <a:noFill/>
+                  </a:rPr>
+                  <a:t> </a:t>
+                </a:r>
+              </a:p>
+            </p:txBody>
+          </p:sp>
+        </mc:Fallback>
+      </mc:AlternateContent>
+      <p:sp>
+        <p:nvSpPr>
+          <p:cNvPr id="20" name="Obdĺžnik 19">
+            <a:extLst>
+              <a:ext uri="{FF2B5EF4-FFF2-40B4-BE49-F238E27FC236}">
+                <a16:creationId xmlns:a16="http://schemas.microsoft.com/office/drawing/2014/main" id="{326F873F-9992-C088-63AB-B82EF768DB90}"/>
+              </a:ext>
+            </a:extLst>
+          </p:cNvPr>
+          <p:cNvSpPr/>
           <p:nvPr/>
         </p:nvSpPr>
         <p:spPr>
           <a:xfrm>
-            <a:off x="5268135" y="2403999"/>
-            <a:ext cx="341760" cy="461665"/>
+            <a:off x="2275008" y="3101578"/>
+            <a:ext cx="144000" cy="36000"/>
           </a:xfrm>
           <a:prstGeom prst="rect">
             <a:avLst/>
           </a:prstGeom>
-          <a:noFill/>
+          <a:solidFill>
+            <a:schemeClr val="tx2"/>
+          </a:solidFill>
+          <a:ln w="6350">
+            <a:noFill/>
+          </a:ln>
         </p:spPr>
-        <p:txBody>
-          <a:bodyPr wrap="none" rtlCol="0">
-            <a:spAutoFit/>
-          </a:bodyPr>
+        <p:style>
+          <a:lnRef idx="2">
+            <a:schemeClr val="accent1">
+              <a:shade val="50000"/>
+            </a:schemeClr>
+          </a:lnRef>
+          <a:fillRef idx="1">
+            <a:schemeClr val="accent1"/>
+          </a:fillRef>
+          <a:effectRef idx="0">
+            <a:schemeClr val="accent1"/>
+          </a:effectRef>
+          <a:fontRef idx="minor">
+            <a:schemeClr val="lt1"/>
+          </a:fontRef>
+        </p:style>
+        <p:txBody>
+          <a:bodyPr rtlCol="0" anchor="ctr"/>
           <a:lstStyle/>
           <a:p>
-            <a:r>
-              <a:rPr lang="el-GR" sz="2400" i="1" dirty="0">
-                <a:ea typeface="Calibri" panose="020F0502020204030204" pitchFamily="34" charset="0"/>
-                <a:cs typeface="Calibri" panose="020F0502020204030204" pitchFamily="34" charset="0"/>
-              </a:rPr>
-              <a:t>ρ</a:t>
-            </a:r>
-            <a:endParaRPr lang="en-US" sz="2400" baseline="-25000" dirty="0">
-              <a:latin typeface="Baskerville Old Face" panose="02020602080505020303" pitchFamily="18" charset="0"/>
-            </a:endParaRPr>
-          </a:p>
-        </p:txBody>
-      </p:sp>
-      <p:sp>
-        <p:nvSpPr>
-          <p:cNvPr id="33" name="BlokTextu 32">
-            <a:extLst>
-              <a:ext uri="{FF2B5EF4-FFF2-40B4-BE49-F238E27FC236}">
-                <a16:creationId xmlns:a16="http://schemas.microsoft.com/office/drawing/2014/main" id="{48A33A04-DEFD-DF7E-F09E-A471106192EC}"/>
-              </a:ext>
-            </a:extLst>
-          </p:cNvPr>
-          <p:cNvSpPr txBox="1"/>
+            <a:pPr algn="ctr"/>
+            <a:endParaRPr lang="en-US" dirty="0"/>
+          </a:p>
+        </p:txBody>
+      </p:sp>
+      <p:grpSp>
+        <p:nvGrpSpPr>
+          <p:cNvPr id="32" name="Skupina 31">
+            <a:extLst>
+              <a:ext uri="{FF2B5EF4-FFF2-40B4-BE49-F238E27FC236}">
+                <a16:creationId xmlns:a16="http://schemas.microsoft.com/office/drawing/2014/main" id="{E9B0F03B-24B3-D638-9ACF-F9F36B273B84}"/>
+              </a:ext>
+            </a:extLst>
+          </p:cNvPr>
+          <p:cNvGrpSpPr/>
           <p:nvPr/>
-        </p:nvSpPr>
-        <p:spPr>
+        </p:nvGrpSpPr>
+        <p:grpSpPr>
           <a:xfrm>
-            <a:off x="7724514" y="2433288"/>
-            <a:ext cx="341760" cy="461665"/>
-          </a:xfrm>
-          <a:prstGeom prst="rect">
-            <a:avLst/>
-          </a:prstGeom>
-          <a:noFill/>
-        </p:spPr>
-        <p:txBody>
-          <a:bodyPr wrap="none" rtlCol="0">
-            <a:spAutoFit/>
-          </a:bodyPr>
-          <a:lstStyle/>
-          <a:p>
-            <a:r>
-              <a:rPr lang="el-GR" sz="2400" i="1" dirty="0">
-                <a:highlight>
-                  <a:srgbClr val="FFFF00"/>
-                </a:highlight>
-                <a:ea typeface="Calibri" panose="020F0502020204030204" pitchFamily="34" charset="0"/>
-                <a:cs typeface="Calibri" panose="020F0502020204030204" pitchFamily="34" charset="0"/>
-              </a:rPr>
-              <a:t>ρ</a:t>
-            </a:r>
-            <a:endParaRPr lang="en-US" sz="2400" baseline="-25000" dirty="0">
-              <a:highlight>
-                <a:srgbClr val="FFFF00"/>
-              </a:highlight>
-              <a:latin typeface="Baskerville Old Face" panose="02020602080505020303" pitchFamily="18" charset="0"/>
-            </a:endParaRPr>
-          </a:p>
-        </p:txBody>
-      </p:sp>
+            <a:off x="2272344" y="2606092"/>
+            <a:ext cx="144000" cy="144000"/>
+            <a:chOff x="2193055" y="1800312"/>
+            <a:chExt cx="222552" cy="222552"/>
+          </a:xfrm>
+        </p:grpSpPr>
+        <p:sp>
+          <p:nvSpPr>
+            <p:cNvPr id="24" name="Obdĺžnik 23">
+              <a:extLst>
+                <a:ext uri="{FF2B5EF4-FFF2-40B4-BE49-F238E27FC236}">
+                  <a16:creationId xmlns:a16="http://schemas.microsoft.com/office/drawing/2014/main" id="{A3E4A4DC-92A2-C751-9A51-4AE9C23333F1}"/>
+                </a:ext>
+              </a:extLst>
+            </p:cNvPr>
+            <p:cNvSpPr/>
+            <p:nvPr/>
+          </p:nvSpPr>
+          <p:spPr>
+            <a:xfrm>
+              <a:off x="2193055" y="1888728"/>
+              <a:ext cx="222552" cy="45719"/>
+            </a:xfrm>
+            <a:prstGeom prst="rect">
+              <a:avLst/>
+            </a:prstGeom>
+            <a:solidFill>
+              <a:schemeClr val="tx2"/>
+            </a:solidFill>
+            <a:ln w="6350">
+              <a:noFill/>
+            </a:ln>
+          </p:spPr>
+          <p:style>
+            <a:lnRef idx="2">
+              <a:schemeClr val="accent1">
+                <a:shade val="50000"/>
+              </a:schemeClr>
+            </a:lnRef>
+            <a:fillRef idx="1">
+              <a:schemeClr val="accent1"/>
+            </a:fillRef>
+            <a:effectRef idx="0">
+              <a:schemeClr val="accent1"/>
+            </a:effectRef>
+            <a:fontRef idx="minor">
+              <a:schemeClr val="lt1"/>
+            </a:fontRef>
+          </p:style>
+          <p:txBody>
+            <a:bodyPr rtlCol="0" anchor="ctr"/>
+            <a:lstStyle/>
+            <a:p>
+              <a:pPr algn="ctr"/>
+              <a:endParaRPr lang="en-US" dirty="0"/>
+            </a:p>
+          </p:txBody>
+        </p:sp>
+        <p:sp>
+          <p:nvSpPr>
+            <p:cNvPr id="31" name="Obdĺžnik 30">
+              <a:extLst>
+                <a:ext uri="{FF2B5EF4-FFF2-40B4-BE49-F238E27FC236}">
+                  <a16:creationId xmlns:a16="http://schemas.microsoft.com/office/drawing/2014/main" id="{142492C7-7955-BA5C-103C-190A6B08E43B}"/>
+                </a:ext>
+              </a:extLst>
+            </p:cNvPr>
+            <p:cNvSpPr/>
+            <p:nvPr/>
+          </p:nvSpPr>
+          <p:spPr>
+            <a:xfrm rot="5400000">
+              <a:off x="2193054" y="1888728"/>
+              <a:ext cx="222552" cy="45719"/>
+            </a:xfrm>
+            <a:prstGeom prst="rect">
+              <a:avLst/>
+            </a:prstGeom>
+            <a:solidFill>
+              <a:schemeClr val="tx2"/>
+            </a:solidFill>
+            <a:ln w="6350">
+              <a:noFill/>
+            </a:ln>
+          </p:spPr>
+          <p:style>
+            <a:lnRef idx="2">
+              <a:schemeClr val="accent1">
+                <a:shade val="50000"/>
+              </a:schemeClr>
+            </a:lnRef>
+            <a:fillRef idx="1">
+              <a:schemeClr val="accent1"/>
+            </a:fillRef>
+            <a:effectRef idx="0">
+              <a:schemeClr val="accent1"/>
+            </a:effectRef>
+            <a:fontRef idx="minor">
+              <a:schemeClr val="lt1"/>
+            </a:fontRef>
+          </p:style>
+          <p:txBody>
+            <a:bodyPr rtlCol="0" anchor="ctr"/>
+            <a:lstStyle/>
+            <a:p>
+              <a:pPr algn="ctr"/>
+              <a:endParaRPr lang="en-US" dirty="0"/>
+            </a:p>
+          </p:txBody>
+        </p:sp>
+      </p:grpSp>
     </p:spTree>
     <p:extLst>
       <p:ext uri="{BB962C8B-B14F-4D97-AF65-F5344CB8AC3E}">

</xml_diff>